<commit_message>
update bidirectional image and some phrasing in paper
</commit_message>
<xml_diff>
--- a/paper/figures/images/bidirectional-net.pptx
+++ b/paper/figures/images/bidirectional-net.pptx
@@ -259,7 +259,7 @@
           <a:p>
             <a:fld id="{CF1799D4-203D-5740-B33A-05ABB6AE63CC}" type="datetimeFigureOut">
               <a:rPr lang="en-US" smtClean="0"/>
-              <a:t>8/21/19</a:t>
+              <a:t>10/2/19</a:t>
             </a:fld>
             <a:endParaRPr lang="en-US"/>
           </a:p>
@@ -457,7 +457,7 @@
           <a:p>
             <a:fld id="{CF1799D4-203D-5740-B33A-05ABB6AE63CC}" type="datetimeFigureOut">
               <a:rPr lang="en-US" smtClean="0"/>
-              <a:t>8/21/19</a:t>
+              <a:t>10/2/19</a:t>
             </a:fld>
             <a:endParaRPr lang="en-US"/>
           </a:p>
@@ -665,7 +665,7 @@
           <a:p>
             <a:fld id="{CF1799D4-203D-5740-B33A-05ABB6AE63CC}" type="datetimeFigureOut">
               <a:rPr lang="en-US" smtClean="0"/>
-              <a:t>8/21/19</a:t>
+              <a:t>10/2/19</a:t>
             </a:fld>
             <a:endParaRPr lang="en-US"/>
           </a:p>
@@ -863,7 +863,7 @@
           <a:p>
             <a:fld id="{CF1799D4-203D-5740-B33A-05ABB6AE63CC}" type="datetimeFigureOut">
               <a:rPr lang="en-US" smtClean="0"/>
-              <a:t>8/21/19</a:t>
+              <a:t>10/2/19</a:t>
             </a:fld>
             <a:endParaRPr lang="en-US"/>
           </a:p>
@@ -1138,7 +1138,7 @@
           <a:p>
             <a:fld id="{CF1799D4-203D-5740-B33A-05ABB6AE63CC}" type="datetimeFigureOut">
               <a:rPr lang="en-US" smtClean="0"/>
-              <a:t>8/21/19</a:t>
+              <a:t>10/2/19</a:t>
             </a:fld>
             <a:endParaRPr lang="en-US"/>
           </a:p>
@@ -1403,7 +1403,7 @@
           <a:p>
             <a:fld id="{CF1799D4-203D-5740-B33A-05ABB6AE63CC}" type="datetimeFigureOut">
               <a:rPr lang="en-US" smtClean="0"/>
-              <a:t>8/21/19</a:t>
+              <a:t>10/2/19</a:t>
             </a:fld>
             <a:endParaRPr lang="en-US"/>
           </a:p>
@@ -1815,7 +1815,7 @@
           <a:p>
             <a:fld id="{CF1799D4-203D-5740-B33A-05ABB6AE63CC}" type="datetimeFigureOut">
               <a:rPr lang="en-US" smtClean="0"/>
-              <a:t>8/21/19</a:t>
+              <a:t>10/2/19</a:t>
             </a:fld>
             <a:endParaRPr lang="en-US"/>
           </a:p>
@@ -1956,7 +1956,7 @@
           <a:p>
             <a:fld id="{CF1799D4-203D-5740-B33A-05ABB6AE63CC}" type="datetimeFigureOut">
               <a:rPr lang="en-US" smtClean="0"/>
-              <a:t>8/21/19</a:t>
+              <a:t>10/2/19</a:t>
             </a:fld>
             <a:endParaRPr lang="en-US"/>
           </a:p>
@@ -2069,7 +2069,7 @@
           <a:p>
             <a:fld id="{CF1799D4-203D-5740-B33A-05ABB6AE63CC}" type="datetimeFigureOut">
               <a:rPr lang="en-US" smtClean="0"/>
-              <a:t>8/21/19</a:t>
+              <a:t>10/2/19</a:t>
             </a:fld>
             <a:endParaRPr lang="en-US"/>
           </a:p>
@@ -2380,7 +2380,7 @@
           <a:p>
             <a:fld id="{CF1799D4-203D-5740-B33A-05ABB6AE63CC}" type="datetimeFigureOut">
               <a:rPr lang="en-US" smtClean="0"/>
-              <a:t>8/21/19</a:t>
+              <a:t>10/2/19</a:t>
             </a:fld>
             <a:endParaRPr lang="en-US"/>
           </a:p>
@@ -2668,7 +2668,7 @@
           <a:p>
             <a:fld id="{CF1799D4-203D-5740-B33A-05ABB6AE63CC}" type="datetimeFigureOut">
               <a:rPr lang="en-US" smtClean="0"/>
-              <a:t>8/21/19</a:t>
+              <a:t>10/2/19</a:t>
             </a:fld>
             <a:endParaRPr lang="en-US"/>
           </a:p>
@@ -2909,7 +2909,7 @@
           <a:p>
             <a:fld id="{CF1799D4-203D-5740-B33A-05ABB6AE63CC}" type="datetimeFigureOut">
               <a:rPr lang="en-US" smtClean="0"/>
-              <a:t>8/21/19</a:t>
+              <a:t>10/2/19</a:t>
             </a:fld>
             <a:endParaRPr lang="en-US"/>
           </a:p>
@@ -3486,7 +3486,7 @@
                   <a:schemeClr val="accent1"/>
                 </a:solidFill>
               </a:rPr>
-              <a:t>i-4</a:t>
+              <a:t>i-2</a:t>
             </a:r>
             <a:endParaRPr lang="en-US" dirty="0">
               <a:solidFill>
@@ -3877,7 +3877,7 @@
                   <a:schemeClr val="accent1"/>
                 </a:solidFill>
               </a:rPr>
-              <a:t>i-3</a:t>
+              <a:t>i-1</a:t>
             </a:r>
             <a:endParaRPr lang="en-US" dirty="0">
               <a:solidFill>
@@ -3946,7 +3946,7 @@
                   <a:schemeClr val="accent1"/>
                 </a:solidFill>
               </a:rPr>
-              <a:t>i-2</a:t>
+              <a:t>i</a:t>
             </a:r>
             <a:endParaRPr lang="en-US" dirty="0">
               <a:solidFill>
@@ -4015,7 +4015,7 @@
                   <a:schemeClr val="accent1"/>
                 </a:solidFill>
               </a:rPr>
-              <a:t>i-1</a:t>
+              <a:t>i+1</a:t>
             </a:r>
             <a:endParaRPr lang="en-US" dirty="0">
               <a:solidFill>
@@ -4084,7 +4084,7 @@
                   <a:schemeClr val="accent1"/>
                 </a:solidFill>
               </a:rPr>
-              <a:t>i</a:t>
+              <a:t>i+2</a:t>
             </a:r>
             <a:endParaRPr lang="en-US" dirty="0">
               <a:solidFill>

</xml_diff>